<commit_message>
Latest With Use Cases
</commit_message>
<xml_diff>
--- a/BY Ayush for project/Online Return.pptx
+++ b/BY Ayush for project/Online Return.pptx
@@ -7,6 +7,9 @@
   <p:sldIdLst>
     <p:sldId id="256" r:id="rId2"/>
     <p:sldId id="257" r:id="rId3"/>
+    <p:sldId id="259" r:id="rId4"/>
+    <p:sldId id="260" r:id="rId5"/>
+    <p:sldId id="261" r:id="rId6"/>
   </p:sldIdLst>
   <p:sldSz cx="12192000" cy="6858000"/>
   <p:notesSz cx="6858000" cy="9144000"/>
@@ -3095,6 +3098,219 @@
 </p:sld>
 </file>
 
+<file path=ppt/slides/slide3.xml><?xml version="1.0" encoding="utf-8"?>
+<p:sld xmlns:a="http://schemas.openxmlformats.org/drawingml/2006/main" xmlns:r="http://schemas.openxmlformats.org/officeDocument/2006/relationships" xmlns:p="http://schemas.openxmlformats.org/presentationml/2006/main">
+  <p:cSld>
+    <p:spTree>
+      <p:nvGrpSpPr>
+        <p:cNvPr id="1" name=""/>
+        <p:cNvGrpSpPr/>
+        <p:nvPr/>
+      </p:nvGrpSpPr>
+      <p:grpSpPr>
+        <a:xfrm>
+          <a:off x="0" y="0"/>
+          <a:ext cx="0" cy="0"/>
+          <a:chOff x="0" y="0"/>
+          <a:chExt cx="0" cy="0"/>
+        </a:xfrm>
+      </p:grpSpPr>
+      <p:pic>
+        <p:nvPicPr>
+          <p:cNvPr id="1028" name="Picture 4" descr="https://documents.lucidchart.com/documents/a1e98e32-fd67-464b-b282-dac8597c6c15/pages/~7PW.lekc_3L?a=2103&amp;x=141&amp;y=64&amp;w=858&amp;h=1232&amp;store=1&amp;accept=image%2F*&amp;auth=LCA%20a89cbd0fb4820f1916f8d27525e0de9916325ea4-ts%3D1569909084"/>
+          <p:cNvPicPr>
+            <a:picLocks noChangeAspect="1" noChangeArrowheads="1"/>
+          </p:cNvPicPr>
+          <p:nvPr/>
+        </p:nvPicPr>
+        <p:blipFill>
+          <a:blip r:embed="rId2">
+            <a:extLst>
+              <a:ext uri="{28A0092B-C50C-407E-A947-70E740481C1C}">
+                <a14:useLocalDpi xmlns:a14="http://schemas.microsoft.com/office/drawing/2010/main" val="0"/>
+              </a:ext>
+            </a:extLst>
+          </a:blip>
+          <a:srcRect/>
+          <a:stretch>
+            <a:fillRect/>
+          </a:stretch>
+        </p:blipFill>
+        <p:spPr bwMode="auto">
+          <a:xfrm>
+            <a:off x="3220795" y="75135"/>
+            <a:ext cx="4727451" cy="6782865"/>
+          </a:xfrm>
+          <a:prstGeom prst="rect">
+            <a:avLst/>
+          </a:prstGeom>
+          <a:noFill/>
+          <a:extLst>
+            <a:ext uri="{909E8E84-426E-40DD-AFC4-6F175D3DCCD1}">
+              <a14:hiddenFill xmlns:a14="http://schemas.microsoft.com/office/drawing/2010/main">
+                <a:solidFill>
+                  <a:srgbClr val="FFFFFF"/>
+                </a:solidFill>
+              </a14:hiddenFill>
+            </a:ext>
+          </a:extLst>
+        </p:spPr>
+      </p:pic>
+    </p:spTree>
+    <p:extLst>
+      <p:ext uri="{BB962C8B-B14F-4D97-AF65-F5344CB8AC3E}">
+        <p14:creationId xmlns:p14="http://schemas.microsoft.com/office/powerpoint/2010/main" val="3381677424"/>
+      </p:ext>
+    </p:extLst>
+  </p:cSld>
+  <p:clrMapOvr>
+    <a:masterClrMapping/>
+  </p:clrMapOvr>
+</p:sld>
+</file>
+
+<file path=ppt/slides/slide4.xml><?xml version="1.0" encoding="utf-8"?>
+<p:sld xmlns:a="http://schemas.openxmlformats.org/drawingml/2006/main" xmlns:r="http://schemas.openxmlformats.org/officeDocument/2006/relationships" xmlns:p="http://schemas.openxmlformats.org/presentationml/2006/main">
+  <p:cSld>
+    <p:spTree>
+      <p:nvGrpSpPr>
+        <p:cNvPr id="1" name=""/>
+        <p:cNvGrpSpPr/>
+        <p:nvPr/>
+      </p:nvGrpSpPr>
+      <p:grpSpPr>
+        <a:xfrm>
+          <a:off x="0" y="0"/>
+          <a:ext cx="0" cy="0"/>
+          <a:chOff x="0" y="0"/>
+          <a:chExt cx="0" cy="0"/>
+        </a:xfrm>
+      </p:grpSpPr>
+      <p:pic>
+        <p:nvPicPr>
+          <p:cNvPr id="1026" name="Picture 2" descr="https://documents.lucidchart.com/documents/a1e98e32-fd67-464b-b282-dac8597c6c15/pages/0_0?a=1597&amp;x=105&amp;y=104&amp;w=770&amp;h=792&amp;store=1&amp;accept=image%2F*&amp;auth=LCA%20395108c8b26200922945c75e6cbb2ff951a66ae4-ts%3D1569909084"/>
+          <p:cNvPicPr>
+            <a:picLocks noChangeAspect="1" noChangeArrowheads="1"/>
+          </p:cNvPicPr>
+          <p:nvPr/>
+        </p:nvPicPr>
+        <p:blipFill>
+          <a:blip r:embed="rId2">
+            <a:extLst>
+              <a:ext uri="{28A0092B-C50C-407E-A947-70E740481C1C}">
+                <a14:useLocalDpi xmlns:a14="http://schemas.microsoft.com/office/drawing/2010/main" val="0"/>
+              </a:ext>
+            </a:extLst>
+          </a:blip>
+          <a:srcRect/>
+          <a:stretch>
+            <a:fillRect/>
+          </a:stretch>
+        </p:blipFill>
+        <p:spPr bwMode="auto">
+          <a:xfrm>
+            <a:off x="2870640" y="900333"/>
+            <a:ext cx="5495925" cy="5657851"/>
+          </a:xfrm>
+          <a:prstGeom prst="rect">
+            <a:avLst/>
+          </a:prstGeom>
+          <a:noFill/>
+          <a:extLst>
+            <a:ext uri="{909E8E84-426E-40DD-AFC4-6F175D3DCCD1}">
+              <a14:hiddenFill xmlns:a14="http://schemas.microsoft.com/office/drawing/2010/main">
+                <a:solidFill>
+                  <a:srgbClr val="FFFFFF"/>
+                </a:solidFill>
+              </a14:hiddenFill>
+            </a:ext>
+          </a:extLst>
+        </p:spPr>
+      </p:pic>
+    </p:spTree>
+    <p:extLst>
+      <p:ext uri="{BB962C8B-B14F-4D97-AF65-F5344CB8AC3E}">
+        <p14:creationId xmlns:p14="http://schemas.microsoft.com/office/powerpoint/2010/main" val="1295555514"/>
+      </p:ext>
+    </p:extLst>
+  </p:cSld>
+  <p:clrMapOvr>
+    <a:masterClrMapping/>
+  </p:clrMapOvr>
+</p:sld>
+</file>
+
+<file path=ppt/slides/slide5.xml><?xml version="1.0" encoding="utf-8"?>
+<p:sld xmlns:a="http://schemas.openxmlformats.org/drawingml/2006/main" xmlns:r="http://schemas.openxmlformats.org/officeDocument/2006/relationships" xmlns:p="http://schemas.openxmlformats.org/presentationml/2006/main">
+  <p:cSld>
+    <p:spTree>
+      <p:nvGrpSpPr>
+        <p:cNvPr id="1" name=""/>
+        <p:cNvGrpSpPr/>
+        <p:nvPr/>
+      </p:nvGrpSpPr>
+      <p:grpSpPr>
+        <a:xfrm>
+          <a:off x="0" y="0"/>
+          <a:ext cx="0" cy="0"/>
+          <a:chOff x="0" y="0"/>
+          <a:chExt cx="0" cy="0"/>
+        </a:xfrm>
+      </p:grpSpPr>
+      <p:pic>
+        <p:nvPicPr>
+          <p:cNvPr id="2052" name="Picture 4" descr="https://documents.lucidchart.com/documents/a1e98e32-fd67-464b-b282-dac8597c6c15/pages/j0PWhM3VBgoU?a=2106&amp;x=152&amp;y=12&amp;w=1160&amp;h=1056&amp;store=1&amp;accept=image%2F*&amp;auth=LCA%2010240bfaad896e3bb5b976499a9854998d8098da-ts%3D1569909084"/>
+          <p:cNvPicPr>
+            <a:picLocks noChangeAspect="1" noChangeArrowheads="1"/>
+          </p:cNvPicPr>
+          <p:nvPr/>
+        </p:nvPicPr>
+        <p:blipFill>
+          <a:blip r:embed="rId2">
+            <a:extLst>
+              <a:ext uri="{28A0092B-C50C-407E-A947-70E740481C1C}">
+                <a14:useLocalDpi xmlns:a14="http://schemas.microsoft.com/office/drawing/2010/main" val="0"/>
+              </a:ext>
+            </a:extLst>
+          </a:blip>
+          <a:srcRect/>
+          <a:stretch>
+            <a:fillRect/>
+          </a:stretch>
+        </p:blipFill>
+        <p:spPr bwMode="auto">
+          <a:xfrm>
+            <a:off x="3051311" y="703384"/>
+            <a:ext cx="6150353" cy="5598942"/>
+          </a:xfrm>
+          <a:prstGeom prst="rect">
+            <a:avLst/>
+          </a:prstGeom>
+          <a:noFill/>
+          <a:extLst>
+            <a:ext uri="{909E8E84-426E-40DD-AFC4-6F175D3DCCD1}">
+              <a14:hiddenFill xmlns:a14="http://schemas.microsoft.com/office/drawing/2010/main">
+                <a:solidFill>
+                  <a:srgbClr val="FFFFFF"/>
+                </a:solidFill>
+              </a14:hiddenFill>
+            </a:ext>
+          </a:extLst>
+        </p:spPr>
+      </p:pic>
+    </p:spTree>
+    <p:extLst>
+      <p:ext uri="{BB962C8B-B14F-4D97-AF65-F5344CB8AC3E}">
+        <p14:creationId xmlns:p14="http://schemas.microsoft.com/office/powerpoint/2010/main" val="3805935706"/>
+      </p:ext>
+    </p:extLst>
+  </p:cSld>
+  <p:clrMapOvr>
+    <a:masterClrMapping/>
+  </p:clrMapOvr>
+</p:sld>
+</file>
+
 <file path=ppt/theme/theme1.xml><?xml version="1.0" encoding="utf-8"?>
 <a:theme xmlns:a="http://schemas.openxmlformats.org/drawingml/2006/main" name="Office Theme">
   <a:themeElements>

</xml_diff>

<commit_message>
Latest with all updates
</commit_message>
<xml_diff>
--- a/BY Ayush for project/Online Return.pptx
+++ b/BY Ayush for project/Online Return.pptx
@@ -10,6 +10,12 @@
     <p:sldId id="259" r:id="rId4"/>
     <p:sldId id="260" r:id="rId5"/>
     <p:sldId id="261" r:id="rId6"/>
+    <p:sldId id="263" r:id="rId7"/>
+    <p:sldId id="264" r:id="rId8"/>
+    <p:sldId id="265" r:id="rId9"/>
+    <p:sldId id="266" r:id="rId10"/>
+    <p:sldId id="267" r:id="rId11"/>
+    <p:sldId id="268" r:id="rId12"/>
   </p:sldIdLst>
   <p:sldSz cx="12192000" cy="6858000"/>
   <p:notesSz cx="6858000" cy="9144000"/>
@@ -3027,6 +3033,230 @@
 </p:sld>
 </file>
 
+<file path=ppt/slides/slide10.xml><?xml version="1.0" encoding="utf-8"?>
+<p:sld xmlns:a="http://schemas.openxmlformats.org/drawingml/2006/main" xmlns:r="http://schemas.openxmlformats.org/officeDocument/2006/relationships" xmlns:p="http://schemas.openxmlformats.org/presentationml/2006/main">
+  <p:cSld>
+    <p:spTree>
+      <p:nvGrpSpPr>
+        <p:cNvPr id="1" name=""/>
+        <p:cNvGrpSpPr/>
+        <p:nvPr/>
+      </p:nvGrpSpPr>
+      <p:grpSpPr>
+        <a:xfrm>
+          <a:off x="0" y="0"/>
+          <a:ext cx="0" cy="0"/>
+          <a:chOff x="0" y="0"/>
+          <a:chExt cx="0" cy="0"/>
+        </a:xfrm>
+      </p:grpSpPr>
+      <p:sp>
+        <p:nvSpPr>
+          <p:cNvPr id="2" name="Title 1">
+            <a:extLst>
+              <a:ext uri="{FF2B5EF4-FFF2-40B4-BE49-F238E27FC236}">
+                <a16:creationId xmlns:a16="http://schemas.microsoft.com/office/drawing/2014/main" xmlns="" id="{36F4321F-694F-4DF5-928C-E6AF320B2A61}"/>
+              </a:ext>
+            </a:extLst>
+          </p:cNvPr>
+          <p:cNvSpPr>
+            <a:spLocks noGrp="1"/>
+          </p:cNvSpPr>
+          <p:nvPr>
+            <p:ph type="title"/>
+          </p:nvPr>
+        </p:nvSpPr>
+        <p:spPr>
+          <a:xfrm>
+            <a:off x="969963" y="247650"/>
+            <a:ext cx="9905998" cy="768322"/>
+          </a:xfrm>
+        </p:spPr>
+        <p:txBody>
+          <a:bodyPr>
+            <a:normAutofit/>
+          </a:bodyPr>
+          <a:lstStyle/>
+          <a:p>
+            <a:r>
+              <a:rPr lang="en-US" sz="3200" b="1" dirty="0" smtClean="0">
+                <a:latin typeface="Times New Roman" panose="02020603050405020304" pitchFamily="18" charset="0"/>
+                <a:cs typeface="Times New Roman" panose="02020603050405020304" pitchFamily="18" charset="0"/>
+              </a:rPr>
+              <a:t>           Class </a:t>
+            </a:r>
+            <a:r>
+              <a:rPr lang="en-US" sz="3200" b="1" dirty="0">
+                <a:latin typeface="Times New Roman" panose="02020603050405020304" pitchFamily="18" charset="0"/>
+                <a:cs typeface="Times New Roman" panose="02020603050405020304" pitchFamily="18" charset="0"/>
+              </a:rPr>
+              <a:t>D</a:t>
+            </a:r>
+            <a:r>
+              <a:rPr lang="en-US" sz="3200" b="1" dirty="0" smtClean="0">
+                <a:latin typeface="Times New Roman" panose="02020603050405020304" pitchFamily="18" charset="0"/>
+                <a:cs typeface="Times New Roman" panose="02020603050405020304" pitchFamily="18" charset="0"/>
+              </a:rPr>
+              <a:t>iagram</a:t>
+            </a:r>
+            <a:endParaRPr lang="en-US" sz="3200" b="1" dirty="0">
+              <a:latin typeface="Times New Roman" panose="02020603050405020304" pitchFamily="18" charset="0"/>
+              <a:cs typeface="Times New Roman" panose="02020603050405020304" pitchFamily="18" charset="0"/>
+            </a:endParaRPr>
+          </a:p>
+        </p:txBody>
+      </p:sp>
+      <p:pic>
+        <p:nvPicPr>
+          <p:cNvPr id="3074" name="Picture 2" descr="https://documents.lucidchart.com/documents/2df039bd-ed3f-48b2-bc59-8912157cbf0e/pages/0_0?a=1186&amp;x=-66&amp;y=162&amp;w=1892&amp;h=828&amp;store=1&amp;accept=image%2F*&amp;auth=LCA%20a00273fc08671f824104472007634b93dd19387f-ts%3D1568574896"/>
+          <p:cNvPicPr>
+            <a:picLocks noChangeAspect="1" noChangeArrowheads="1"/>
+          </p:cNvPicPr>
+          <p:nvPr/>
+        </p:nvPicPr>
+        <p:blipFill>
+          <a:blip r:embed="rId2"/>
+          <a:srcRect/>
+          <a:stretch>
+            <a:fillRect/>
+          </a:stretch>
+        </p:blipFill>
+        <p:spPr bwMode="auto">
+          <a:xfrm>
+            <a:off x="1323832" y="1215780"/>
+            <a:ext cx="9894628" cy="4830178"/>
+          </a:xfrm>
+          <a:prstGeom prst="rect">
+            <a:avLst/>
+          </a:prstGeom>
+          <a:noFill/>
+        </p:spPr>
+      </p:pic>
+    </p:spTree>
+    <p:extLst>
+      <p:ext uri="{BB962C8B-B14F-4D97-AF65-F5344CB8AC3E}">
+        <p14:creationId xmlns:p14="http://schemas.microsoft.com/office/powerpoint/2010/main" val="1542577995"/>
+      </p:ext>
+    </p:extLst>
+  </p:cSld>
+  <p:clrMapOvr>
+    <a:masterClrMapping/>
+  </p:clrMapOvr>
+</p:sld>
+</file>
+
+<file path=ppt/slides/slide11.xml><?xml version="1.0" encoding="utf-8"?>
+<p:sld xmlns:a="http://schemas.openxmlformats.org/drawingml/2006/main" xmlns:r="http://schemas.openxmlformats.org/officeDocument/2006/relationships" xmlns:p="http://schemas.openxmlformats.org/presentationml/2006/main">
+  <p:cSld>
+    <p:spTree>
+      <p:nvGrpSpPr>
+        <p:cNvPr id="1" name=""/>
+        <p:cNvGrpSpPr/>
+        <p:nvPr/>
+      </p:nvGrpSpPr>
+      <p:grpSpPr>
+        <a:xfrm>
+          <a:off x="0" y="0"/>
+          <a:ext cx="0" cy="0"/>
+          <a:chOff x="0" y="0"/>
+          <a:chExt cx="0" cy="0"/>
+        </a:xfrm>
+      </p:grpSpPr>
+      <p:sp>
+        <p:nvSpPr>
+          <p:cNvPr id="2" name="Title 1">
+            <a:extLst>
+              <a:ext uri="{FF2B5EF4-FFF2-40B4-BE49-F238E27FC236}">
+                <a16:creationId xmlns:a16="http://schemas.microsoft.com/office/drawing/2014/main" xmlns="" id="{36F4321F-694F-4DF5-928C-E6AF320B2A61}"/>
+              </a:ext>
+            </a:extLst>
+          </p:cNvPr>
+          <p:cNvSpPr>
+            <a:spLocks noGrp="1"/>
+          </p:cNvSpPr>
+          <p:nvPr>
+            <p:ph type="title"/>
+          </p:nvPr>
+        </p:nvSpPr>
+        <p:spPr>
+          <a:xfrm>
+            <a:off x="665163" y="0"/>
+            <a:ext cx="9736137" cy="825472"/>
+          </a:xfrm>
+        </p:spPr>
+        <p:txBody>
+          <a:bodyPr>
+            <a:normAutofit/>
+          </a:bodyPr>
+          <a:lstStyle/>
+          <a:p>
+            <a:r>
+              <a:rPr lang="en-US" sz="3200" b="1" dirty="0" smtClean="0">
+                <a:latin typeface="Times New Roman" panose="02020603050405020304" pitchFamily="18" charset="0"/>
+                <a:cs typeface="Times New Roman" panose="02020603050405020304" pitchFamily="18" charset="0"/>
+              </a:rPr>
+              <a:t>          Class </a:t>
+            </a:r>
+            <a:r>
+              <a:rPr lang="en-US" sz="3200" b="1" dirty="0">
+                <a:latin typeface="Times New Roman" panose="02020603050405020304" pitchFamily="18" charset="0"/>
+                <a:cs typeface="Times New Roman" panose="02020603050405020304" pitchFamily="18" charset="0"/>
+              </a:rPr>
+              <a:t>D</a:t>
+            </a:r>
+            <a:r>
+              <a:rPr lang="en-US" sz="3200" b="1" dirty="0" smtClean="0">
+                <a:latin typeface="Times New Roman" panose="02020603050405020304" pitchFamily="18" charset="0"/>
+                <a:cs typeface="Times New Roman" panose="02020603050405020304" pitchFamily="18" charset="0"/>
+              </a:rPr>
+              <a:t>iagram</a:t>
+            </a:r>
+            <a:endParaRPr lang="en-US" sz="3200" b="1" dirty="0">
+              <a:latin typeface="Times New Roman" panose="02020603050405020304" pitchFamily="18" charset="0"/>
+              <a:cs typeface="Times New Roman" panose="02020603050405020304" pitchFamily="18" charset="0"/>
+            </a:endParaRPr>
+          </a:p>
+        </p:txBody>
+      </p:sp>
+      <p:pic>
+        <p:nvPicPr>
+          <p:cNvPr id="2050" name="Picture 2" descr="https://documents.lucidchart.com/documents/4abd90cc-3ea4-4715-8d0e-89d95c9d1452/pages/0_0?a=1767&amp;x=-45&amp;y=120&amp;w=1870&amp;h=871&amp;store=1&amp;accept=image%2F*&amp;auth=LCA%201e6a8e8863a4d0b9ad2f09ede6215e7c66d0b4aa-ts%3D1568574463"/>
+          <p:cNvPicPr>
+            <a:picLocks noChangeAspect="1" noChangeArrowheads="1"/>
+          </p:cNvPicPr>
+          <p:nvPr/>
+        </p:nvPicPr>
+        <p:blipFill>
+          <a:blip r:embed="rId2"/>
+          <a:srcRect/>
+          <a:stretch>
+            <a:fillRect/>
+          </a:stretch>
+        </p:blipFill>
+        <p:spPr bwMode="auto">
+          <a:xfrm>
+            <a:off x="764274" y="1237420"/>
+            <a:ext cx="11005784" cy="5122436"/>
+          </a:xfrm>
+          <a:prstGeom prst="rect">
+            <a:avLst/>
+          </a:prstGeom>
+          <a:noFill/>
+        </p:spPr>
+      </p:pic>
+    </p:spTree>
+    <p:extLst>
+      <p:ext uri="{BB962C8B-B14F-4D97-AF65-F5344CB8AC3E}">
+        <p14:creationId xmlns:p14="http://schemas.microsoft.com/office/powerpoint/2010/main" val="390595924"/>
+      </p:ext>
+    </p:extLst>
+  </p:cSld>
+  <p:clrMapOvr>
+    <a:masterClrMapping/>
+  </p:clrMapOvr>
+</p:sld>
+</file>
+
 <file path=ppt/slides/slide2.xml><?xml version="1.0" encoding="utf-8"?>
 <p:sld xmlns:a="http://schemas.openxmlformats.org/drawingml/2006/main" xmlns:r="http://schemas.openxmlformats.org/officeDocument/2006/relationships" xmlns:p="http://schemas.openxmlformats.org/presentationml/2006/main">
   <p:cSld>
@@ -3311,6 +3541,707 @@
 </p:sld>
 </file>
 
+<file path=ppt/slides/slide6.xml><?xml version="1.0" encoding="utf-8"?>
+<p:sld xmlns:a="http://schemas.openxmlformats.org/drawingml/2006/main" xmlns:r="http://schemas.openxmlformats.org/officeDocument/2006/relationships" xmlns:p="http://schemas.openxmlformats.org/presentationml/2006/main">
+  <p:cSld>
+    <p:spTree>
+      <p:nvGrpSpPr>
+        <p:cNvPr id="1" name=""/>
+        <p:cNvGrpSpPr/>
+        <p:nvPr/>
+      </p:nvGrpSpPr>
+      <p:grpSpPr>
+        <a:xfrm>
+          <a:off x="0" y="0"/>
+          <a:ext cx="0" cy="0"/>
+          <a:chOff x="0" y="0"/>
+          <a:chExt cx="0" cy="0"/>
+        </a:xfrm>
+      </p:grpSpPr>
+      <p:sp>
+        <p:nvSpPr>
+          <p:cNvPr id="5" name="Rectangle 4"/>
+          <p:cNvSpPr/>
+          <p:nvPr/>
+        </p:nvSpPr>
+        <p:spPr>
+          <a:xfrm>
+            <a:off x="2101101" y="710684"/>
+            <a:ext cx="7712945" cy="584775"/>
+          </a:xfrm>
+          <a:prstGeom prst="rect">
+            <a:avLst/>
+          </a:prstGeom>
+        </p:spPr>
+        <p:txBody>
+          <a:bodyPr wrap="none">
+            <a:spAutoFit/>
+          </a:bodyPr>
+          <a:lstStyle/>
+          <a:p>
+            <a:r>
+              <a:rPr lang="en-US" sz="3200" b="1" dirty="0" smtClean="0">
+                <a:latin typeface="Times New Roman" panose="02020603050405020304" pitchFamily="18" charset="0"/>
+                <a:cs typeface="Times New Roman" panose="02020603050405020304" pitchFamily="18" charset="0"/>
+              </a:rPr>
+              <a:t>Sequence Diagram for Sales Person Details</a:t>
+            </a:r>
+            <a:endParaRPr lang="en-US" sz="3200" dirty="0"/>
+          </a:p>
+        </p:txBody>
+      </p:sp>
+      <p:pic>
+        <p:nvPicPr>
+          <p:cNvPr id="5130" name="Picture 10" descr="https://documents.lucidchart.com/documents/54cc50d9-20e3-4853-8f1d-888a3d1998b5/pages/0_0?a=1067&amp;x=2&amp;y=6&amp;w=1349&amp;h=1215&amp;store=1&amp;accept=image%2F*&amp;auth=LCA%209ebd9eb1b40cd41ba1d23cdc65aea14bc9c32075-ts%3D1568550849"/>
+          <p:cNvPicPr>
+            <a:picLocks noChangeAspect="1" noChangeArrowheads="1"/>
+          </p:cNvPicPr>
+          <p:nvPr/>
+        </p:nvPicPr>
+        <p:blipFill>
+          <a:blip r:embed="rId2"/>
+          <a:srcRect/>
+          <a:stretch>
+            <a:fillRect/>
+          </a:stretch>
+        </p:blipFill>
+        <p:spPr bwMode="auto">
+          <a:xfrm>
+            <a:off x="914401" y="1211262"/>
+            <a:ext cx="10420350" cy="5284788"/>
+          </a:xfrm>
+          <a:prstGeom prst="rect">
+            <a:avLst/>
+          </a:prstGeom>
+          <a:noFill/>
+        </p:spPr>
+      </p:pic>
+    </p:spTree>
+    <p:extLst>
+      <p:ext uri="{BB962C8B-B14F-4D97-AF65-F5344CB8AC3E}">
+        <p14:creationId xmlns:p14="http://schemas.microsoft.com/office/powerpoint/2010/main" val="844658709"/>
+      </p:ext>
+    </p:extLst>
+  </p:cSld>
+  <p:clrMapOvr>
+    <a:masterClrMapping/>
+  </p:clrMapOvr>
+</p:sld>
+</file>
+
+<file path=ppt/slides/slide7.xml><?xml version="1.0" encoding="utf-8"?>
+<p:sld xmlns:a="http://schemas.openxmlformats.org/drawingml/2006/main" xmlns:r="http://schemas.openxmlformats.org/officeDocument/2006/relationships" xmlns:p="http://schemas.openxmlformats.org/presentationml/2006/main">
+  <p:cSld>
+    <p:spTree>
+      <p:nvGrpSpPr>
+        <p:cNvPr id="1" name=""/>
+        <p:cNvGrpSpPr/>
+        <p:nvPr/>
+      </p:nvGrpSpPr>
+      <p:grpSpPr>
+        <a:xfrm>
+          <a:off x="0" y="0"/>
+          <a:ext cx="0" cy="0"/>
+          <a:chOff x="0" y="0"/>
+          <a:chExt cx="0" cy="0"/>
+        </a:xfrm>
+      </p:grpSpPr>
+      <p:sp>
+        <p:nvSpPr>
+          <p:cNvPr id="5" name="Rectangle 4"/>
+          <p:cNvSpPr/>
+          <p:nvPr/>
+        </p:nvSpPr>
+        <p:spPr>
+          <a:xfrm>
+            <a:off x="1276351" y="323850"/>
+            <a:ext cx="9467850" cy="1077218"/>
+          </a:xfrm>
+          <a:prstGeom prst="rect">
+            <a:avLst/>
+          </a:prstGeom>
+        </p:spPr>
+        <p:txBody>
+          <a:bodyPr wrap="square">
+            <a:spAutoFit/>
+          </a:bodyPr>
+          <a:lstStyle/>
+          <a:p>
+            <a:r>
+              <a:rPr lang="en-US" sz="3200" b="1" dirty="0" smtClean="0">
+                <a:latin typeface="Times New Roman" panose="02020603050405020304" pitchFamily="18" charset="0"/>
+                <a:cs typeface="Times New Roman" panose="02020603050405020304" pitchFamily="18" charset="0"/>
+              </a:rPr>
+              <a:t>Sequence Diagram For Getting Sales Target By Sales Representatives</a:t>
+            </a:r>
+            <a:endParaRPr lang="en-US" sz="3200" dirty="0"/>
+          </a:p>
+        </p:txBody>
+      </p:sp>
+      <p:pic>
+        <p:nvPicPr>
+          <p:cNvPr id="33794" name="Picture 2" descr="https://documents.lucidchart.com/documents/b460f2dc-219c-4bc6-a775-77e63ff1cb5e/pages/0_0?a=422&amp;x=27&amp;y=0&amp;w=800&amp;h=1050&amp;store=1&amp;accept=image%2F*&amp;auth=LCA%200418908650cdeff4e5376c2a8eaf40fd1797ef9e-ts%3D1568552867"/>
+          <p:cNvPicPr>
+            <a:picLocks noChangeAspect="1" noChangeArrowheads="1"/>
+          </p:cNvPicPr>
+          <p:nvPr/>
+        </p:nvPicPr>
+        <p:blipFill>
+          <a:blip r:embed="rId2"/>
+          <a:srcRect/>
+          <a:stretch>
+            <a:fillRect/>
+          </a:stretch>
+        </p:blipFill>
+        <p:spPr bwMode="auto">
+          <a:xfrm>
+            <a:off x="1181100" y="1276350"/>
+            <a:ext cx="10077449" cy="5029200"/>
+          </a:xfrm>
+          <a:prstGeom prst="rect">
+            <a:avLst/>
+          </a:prstGeom>
+          <a:noFill/>
+        </p:spPr>
+      </p:pic>
+    </p:spTree>
+    <p:extLst>
+      <p:ext uri="{BB962C8B-B14F-4D97-AF65-F5344CB8AC3E}">
+        <p14:creationId xmlns:p14="http://schemas.microsoft.com/office/powerpoint/2010/main" val="1854167856"/>
+      </p:ext>
+    </p:extLst>
+  </p:cSld>
+  <p:clrMapOvr>
+    <a:masterClrMapping/>
+  </p:clrMapOvr>
+</p:sld>
+</file>
+
+<file path=ppt/slides/slide8.xml><?xml version="1.0" encoding="utf-8"?>
+<p:sld xmlns:a="http://schemas.openxmlformats.org/drawingml/2006/main" xmlns:r="http://schemas.openxmlformats.org/officeDocument/2006/relationships" xmlns:p="http://schemas.openxmlformats.org/presentationml/2006/main">
+  <p:cSld>
+    <p:spTree>
+      <p:nvGrpSpPr>
+        <p:cNvPr id="1" name=""/>
+        <p:cNvGrpSpPr/>
+        <p:nvPr/>
+      </p:nvGrpSpPr>
+      <p:grpSpPr>
+        <a:xfrm>
+          <a:off x="0" y="0"/>
+          <a:ext cx="0" cy="0"/>
+          <a:chOff x="0" y="0"/>
+          <a:chExt cx="0" cy="0"/>
+        </a:xfrm>
+      </p:grpSpPr>
+      <p:sp>
+        <p:nvSpPr>
+          <p:cNvPr id="2" name="Title 1">
+            <a:extLst>
+              <a:ext uri="{FF2B5EF4-FFF2-40B4-BE49-F238E27FC236}">
+                <a16:creationId xmlns:a16="http://schemas.microsoft.com/office/drawing/2014/main" xmlns="" id="{C58B934C-EFD2-454C-88D2-8DD6CE23214B}"/>
+              </a:ext>
+            </a:extLst>
+          </p:cNvPr>
+          <p:cNvSpPr>
+            <a:spLocks noGrp="1"/>
+          </p:cNvSpPr>
+          <p:nvPr>
+            <p:ph type="title"/>
+          </p:nvPr>
+        </p:nvSpPr>
+        <p:spPr>
+          <a:xfrm>
+            <a:off x="703263" y="256568"/>
+            <a:ext cx="9905998" cy="1050262"/>
+          </a:xfrm>
+        </p:spPr>
+        <p:txBody>
+          <a:bodyPr>
+            <a:normAutofit/>
+          </a:bodyPr>
+          <a:lstStyle/>
+          <a:p>
+            <a:r>
+              <a:rPr lang="en-US" sz="3200" b="1" dirty="0" smtClean="0">
+                <a:latin typeface="Times New Roman" panose="02020603050405020304" pitchFamily="18" charset="0"/>
+                <a:cs typeface="Times New Roman" panose="02020603050405020304" pitchFamily="18" charset="0"/>
+              </a:rPr>
+              <a:t>Epic And User Stories</a:t>
+            </a:r>
+            <a:endParaRPr lang="en-US" sz="3200" b="1" dirty="0">
+              <a:latin typeface="Times New Roman" panose="02020603050405020304" pitchFamily="18" charset="0"/>
+              <a:cs typeface="Times New Roman" panose="02020603050405020304" pitchFamily="18" charset="0"/>
+            </a:endParaRPr>
+          </a:p>
+        </p:txBody>
+      </p:sp>
+      <p:sp>
+        <p:nvSpPr>
+          <p:cNvPr id="5" name="TextBox 4"/>
+          <p:cNvSpPr txBox="1"/>
+          <p:nvPr/>
+        </p:nvSpPr>
+        <p:spPr>
+          <a:xfrm>
+            <a:off x="1314506" y="2000501"/>
+            <a:ext cx="7199479" cy="4370427"/>
+          </a:xfrm>
+          <a:prstGeom prst="rect">
+            <a:avLst/>
+          </a:prstGeom>
+          <a:noFill/>
+        </p:spPr>
+        <p:txBody>
+          <a:bodyPr wrap="square" rtlCol="0">
+            <a:spAutoFit/>
+          </a:bodyPr>
+          <a:lstStyle/>
+          <a:p>
+            <a:pPr algn="just">
+              <a:buFont typeface="Arial" pitchFamily="34" charset="0"/>
+              <a:buChar char="•"/>
+            </a:pPr>
+            <a:r>
+              <a:rPr lang="en-US" sz="2000" dirty="0" smtClean="0">
+                <a:latin typeface="Times New Roman" pitchFamily="18" charset="0"/>
+                <a:cs typeface="Times New Roman" pitchFamily="18" charset="0"/>
+              </a:rPr>
+              <a:t>Initialization  of  Return Order by Retailer </a:t>
+            </a:r>
+          </a:p>
+          <a:p>
+            <a:pPr algn="just">
+              <a:buFont typeface="Arial" pitchFamily="34" charset="0"/>
+              <a:buChar char="•"/>
+            </a:pPr>
+            <a:endParaRPr lang="en-US" sz="2000" dirty="0" smtClean="0">
+              <a:latin typeface="Times New Roman" pitchFamily="18" charset="0"/>
+              <a:cs typeface="Times New Roman" pitchFamily="18" charset="0"/>
+            </a:endParaRPr>
+          </a:p>
+          <a:p>
+            <a:pPr algn="just">
+              <a:buFont typeface="Arial" pitchFamily="34" charset="0"/>
+              <a:buChar char="•"/>
+            </a:pPr>
+            <a:r>
+              <a:rPr lang="en-US" sz="2000" dirty="0" smtClean="0">
+                <a:latin typeface="Times New Roman" pitchFamily="18" charset="0"/>
+                <a:cs typeface="Times New Roman" pitchFamily="18" charset="0"/>
+              </a:rPr>
+              <a:t>Validation of  Product Id , Order Id and Quantity of  Product</a:t>
+            </a:r>
+          </a:p>
+          <a:p>
+            <a:pPr algn="just">
+              <a:buFont typeface="Arial" pitchFamily="34" charset="0"/>
+              <a:buChar char="•"/>
+            </a:pPr>
+            <a:endParaRPr lang="en-US" sz="2000" dirty="0" smtClean="0">
+              <a:latin typeface="Times New Roman" pitchFamily="18" charset="0"/>
+              <a:cs typeface="Times New Roman" pitchFamily="18" charset="0"/>
+            </a:endParaRPr>
+          </a:p>
+          <a:p>
+            <a:pPr algn="just">
+              <a:buFont typeface="Arial" pitchFamily="34" charset="0"/>
+              <a:buChar char="•"/>
+            </a:pPr>
+            <a:r>
+              <a:rPr lang="en-US" sz="2000" dirty="0" smtClean="0">
+                <a:latin typeface="Times New Roman" pitchFamily="18" charset="0"/>
+                <a:cs typeface="Times New Roman" pitchFamily="18" charset="0"/>
+              </a:rPr>
+              <a:t>Selection of  Purpose Of  Return</a:t>
+            </a:r>
+          </a:p>
+          <a:p>
+            <a:pPr algn="just"/>
+            <a:endParaRPr lang="en-US" sz="2000" dirty="0" smtClean="0">
+              <a:latin typeface="Times New Roman" pitchFamily="18" charset="0"/>
+              <a:cs typeface="Times New Roman" pitchFamily="18" charset="0"/>
+            </a:endParaRPr>
+          </a:p>
+          <a:p>
+            <a:pPr algn="just">
+              <a:buFont typeface="Arial" pitchFamily="34" charset="0"/>
+              <a:buChar char="•"/>
+            </a:pPr>
+            <a:r>
+              <a:rPr lang="en-US" sz="2000" dirty="0" smtClean="0">
+                <a:latin typeface="Times New Roman" pitchFamily="18" charset="0"/>
+                <a:cs typeface="Times New Roman" pitchFamily="18" charset="0"/>
+              </a:rPr>
+              <a:t>Confirmation of  Return of product by Retailer</a:t>
+            </a:r>
+          </a:p>
+          <a:p>
+            <a:pPr algn="just">
+              <a:buFont typeface="Arial" pitchFamily="34" charset="0"/>
+              <a:buChar char="•"/>
+            </a:pPr>
+            <a:endParaRPr lang="en-US" sz="2000" dirty="0" smtClean="0">
+              <a:latin typeface="Times New Roman" pitchFamily="18" charset="0"/>
+              <a:cs typeface="Times New Roman" pitchFamily="18" charset="0"/>
+            </a:endParaRPr>
+          </a:p>
+          <a:p>
+            <a:pPr algn="just">
+              <a:buFont typeface="Arial" pitchFamily="34" charset="0"/>
+              <a:buChar char="•"/>
+            </a:pPr>
+            <a:r>
+              <a:rPr lang="en-US" sz="2000" dirty="0" smtClean="0">
+                <a:latin typeface="Times New Roman" pitchFamily="18" charset="0"/>
+                <a:cs typeface="Times New Roman" pitchFamily="18" charset="0"/>
+              </a:rPr>
+              <a:t>Generate Return Id </a:t>
+            </a:r>
+          </a:p>
+          <a:p>
+            <a:pPr algn="just">
+              <a:buFont typeface="Arial" pitchFamily="34" charset="0"/>
+              <a:buChar char="•"/>
+            </a:pPr>
+            <a:endParaRPr lang="en-US" sz="2000" dirty="0" smtClean="0">
+              <a:latin typeface="Times New Roman" pitchFamily="18" charset="0"/>
+              <a:cs typeface="Times New Roman" pitchFamily="18" charset="0"/>
+            </a:endParaRPr>
+          </a:p>
+          <a:p>
+            <a:pPr algn="just">
+              <a:buFont typeface="Arial" pitchFamily="34" charset="0"/>
+              <a:buChar char="•"/>
+            </a:pPr>
+            <a:r>
+              <a:rPr lang="en-US" sz="2000" dirty="0" smtClean="0">
+                <a:latin typeface="Times New Roman" pitchFamily="18" charset="0"/>
+                <a:cs typeface="Times New Roman" pitchFamily="18" charset="0"/>
+              </a:rPr>
+              <a:t>Generating Return Reports for different purpose of return</a:t>
+            </a:r>
+          </a:p>
+          <a:p>
+            <a:pPr algn="just">
+              <a:buFont typeface="Arial" pitchFamily="34" charset="0"/>
+              <a:buChar char="•"/>
+            </a:pPr>
+            <a:endParaRPr lang="en-US" sz="2000" dirty="0" smtClean="0">
+              <a:latin typeface="Times New Roman" pitchFamily="18" charset="0"/>
+              <a:cs typeface="Times New Roman" pitchFamily="18" charset="0"/>
+            </a:endParaRPr>
+          </a:p>
+          <a:p>
+            <a:pPr algn="just"/>
+            <a:endParaRPr lang="en-US" sz="2000" dirty="0" smtClean="0">
+              <a:latin typeface="Times New Roman" pitchFamily="18" charset="0"/>
+              <a:cs typeface="Times New Roman" pitchFamily="18" charset="0"/>
+            </a:endParaRPr>
+          </a:p>
+          <a:p>
+            <a:pPr algn="just"/>
+            <a:endParaRPr lang="en-US" dirty="0"/>
+          </a:p>
+        </p:txBody>
+      </p:sp>
+      <p:sp>
+        <p:nvSpPr>
+          <p:cNvPr id="6" name="TextBox 5"/>
+          <p:cNvSpPr txBox="1"/>
+          <p:nvPr/>
+        </p:nvSpPr>
+        <p:spPr>
+          <a:xfrm>
+            <a:off x="1127078" y="1303360"/>
+            <a:ext cx="4076700" cy="461665"/>
+          </a:xfrm>
+          <a:prstGeom prst="rect">
+            <a:avLst/>
+          </a:prstGeom>
+          <a:noFill/>
+        </p:spPr>
+        <p:txBody>
+          <a:bodyPr wrap="square" rtlCol="0">
+            <a:spAutoFit/>
+          </a:bodyPr>
+          <a:lstStyle/>
+          <a:p>
+            <a:pPr>
+              <a:buFont typeface="Arial" pitchFamily="34" charset="0"/>
+              <a:buChar char="•"/>
+            </a:pPr>
+            <a:r>
+              <a:rPr lang="en-US" sz="2400" b="1" dirty="0" smtClean="0">
+                <a:latin typeface="Times New Roman" pitchFamily="18" charset="0"/>
+                <a:cs typeface="Times New Roman" pitchFamily="18" charset="0"/>
+              </a:rPr>
+              <a:t>Return  Online Order</a:t>
+            </a:r>
+            <a:endParaRPr lang="en-US" sz="2400" b="1" dirty="0">
+              <a:latin typeface="Times New Roman" pitchFamily="18" charset="0"/>
+              <a:cs typeface="Times New Roman" pitchFamily="18" charset="0"/>
+            </a:endParaRPr>
+          </a:p>
+        </p:txBody>
+      </p:sp>
+    </p:spTree>
+    <p:extLst>
+      <p:ext uri="{BB962C8B-B14F-4D97-AF65-F5344CB8AC3E}">
+        <p14:creationId xmlns:p14="http://schemas.microsoft.com/office/powerpoint/2010/main" val="1438630539"/>
+      </p:ext>
+    </p:extLst>
+  </p:cSld>
+  <p:clrMapOvr>
+    <a:masterClrMapping/>
+  </p:clrMapOvr>
+</p:sld>
+</file>
+
+<file path=ppt/slides/slide9.xml><?xml version="1.0" encoding="utf-8"?>
+<p:sld xmlns:a="http://schemas.openxmlformats.org/drawingml/2006/main" xmlns:r="http://schemas.openxmlformats.org/officeDocument/2006/relationships" xmlns:p="http://schemas.openxmlformats.org/presentationml/2006/main">
+  <p:cSld>
+    <p:spTree>
+      <p:nvGrpSpPr>
+        <p:cNvPr id="1" name=""/>
+        <p:cNvGrpSpPr/>
+        <p:nvPr/>
+      </p:nvGrpSpPr>
+      <p:grpSpPr>
+        <a:xfrm>
+          <a:off x="0" y="0"/>
+          <a:ext cx="0" cy="0"/>
+          <a:chOff x="0" y="0"/>
+          <a:chExt cx="0" cy="0"/>
+        </a:xfrm>
+      </p:grpSpPr>
+      <p:sp>
+        <p:nvSpPr>
+          <p:cNvPr id="2" name="Title 1">
+            <a:extLst>
+              <a:ext uri="{FF2B5EF4-FFF2-40B4-BE49-F238E27FC236}">
+                <a16:creationId xmlns:a16="http://schemas.microsoft.com/office/drawing/2014/main" xmlns="" id="{C58B934C-EFD2-454C-88D2-8DD6CE23214B}"/>
+              </a:ext>
+            </a:extLst>
+          </p:cNvPr>
+          <p:cNvSpPr>
+            <a:spLocks noGrp="1"/>
+          </p:cNvSpPr>
+          <p:nvPr>
+            <p:ph type="title"/>
+          </p:nvPr>
+        </p:nvSpPr>
+        <p:spPr>
+          <a:xfrm>
+            <a:off x="1103313" y="313718"/>
+            <a:ext cx="9905998" cy="1050262"/>
+          </a:xfrm>
+        </p:spPr>
+        <p:txBody>
+          <a:bodyPr>
+            <a:normAutofit/>
+          </a:bodyPr>
+          <a:lstStyle/>
+          <a:p>
+            <a:r>
+              <a:rPr lang="en-US" sz="3200" b="1" dirty="0" smtClean="0">
+                <a:latin typeface="Times New Roman" panose="02020603050405020304" pitchFamily="18" charset="0"/>
+                <a:cs typeface="Times New Roman" panose="02020603050405020304" pitchFamily="18" charset="0"/>
+              </a:rPr>
+              <a:t>Epic And User Stories</a:t>
+            </a:r>
+            <a:endParaRPr lang="en-US" sz="3200" b="1" dirty="0">
+              <a:latin typeface="Times New Roman" panose="02020603050405020304" pitchFamily="18" charset="0"/>
+              <a:cs typeface="Times New Roman" panose="02020603050405020304" pitchFamily="18" charset="0"/>
+            </a:endParaRPr>
+          </a:p>
+        </p:txBody>
+      </p:sp>
+      <p:sp>
+        <p:nvSpPr>
+          <p:cNvPr id="5" name="TextBox 4"/>
+          <p:cNvSpPr txBox="1"/>
+          <p:nvPr/>
+        </p:nvSpPr>
+        <p:spPr>
+          <a:xfrm>
+            <a:off x="918948" y="2712808"/>
+            <a:ext cx="9344167" cy="3262432"/>
+          </a:xfrm>
+          <a:prstGeom prst="rect">
+            <a:avLst/>
+          </a:prstGeom>
+          <a:noFill/>
+        </p:spPr>
+        <p:txBody>
+          <a:bodyPr wrap="square" rtlCol="0">
+            <a:spAutoFit/>
+          </a:bodyPr>
+          <a:lstStyle/>
+          <a:p>
+            <a:pPr>
+              <a:buFont typeface="Arial" pitchFamily="34" charset="0"/>
+              <a:buChar char="•"/>
+            </a:pPr>
+            <a:r>
+              <a:rPr lang="en-US" sz="2000" dirty="0" smtClean="0">
+                <a:latin typeface="Times New Roman" pitchFamily="18" charset="0"/>
+                <a:cs typeface="Times New Roman" pitchFamily="18" charset="0"/>
+              </a:rPr>
+              <a:t>Adding, Updating , Deleting Sales Person Details </a:t>
+            </a:r>
+          </a:p>
+          <a:p>
+            <a:pPr>
+              <a:buFont typeface="Arial" pitchFamily="34" charset="0"/>
+              <a:buChar char="•"/>
+            </a:pPr>
+            <a:endParaRPr lang="en-US" sz="2000" dirty="0" smtClean="0">
+              <a:latin typeface="Times New Roman" pitchFamily="18" charset="0"/>
+              <a:cs typeface="Times New Roman" pitchFamily="18" charset="0"/>
+            </a:endParaRPr>
+          </a:p>
+          <a:p>
+            <a:pPr>
+              <a:buFont typeface="Arial" pitchFamily="34" charset="0"/>
+              <a:buChar char="•"/>
+            </a:pPr>
+            <a:r>
+              <a:rPr lang="en-US" sz="2000" dirty="0" smtClean="0">
+                <a:latin typeface="Times New Roman" pitchFamily="18" charset="0"/>
+                <a:cs typeface="Times New Roman" pitchFamily="18" charset="0"/>
+              </a:rPr>
+              <a:t>Generating Sales Person Id</a:t>
+            </a:r>
+          </a:p>
+          <a:p>
+            <a:pPr>
+              <a:buFont typeface="Arial" pitchFamily="34" charset="0"/>
+              <a:buChar char="•"/>
+            </a:pPr>
+            <a:endParaRPr lang="en-US" sz="2000" dirty="0" smtClean="0">
+              <a:latin typeface="Times New Roman" pitchFamily="18" charset="0"/>
+              <a:cs typeface="Times New Roman" pitchFamily="18" charset="0"/>
+            </a:endParaRPr>
+          </a:p>
+          <a:p>
+            <a:pPr>
+              <a:buFont typeface="Arial" pitchFamily="34" charset="0"/>
+              <a:buChar char="•"/>
+            </a:pPr>
+            <a:r>
+              <a:rPr lang="en-US" sz="2000" dirty="0" smtClean="0">
+                <a:latin typeface="Times New Roman" pitchFamily="18" charset="0"/>
+                <a:cs typeface="Times New Roman" pitchFamily="18" charset="0"/>
+              </a:rPr>
+              <a:t>Generating Sales Person Target Report  for monthly ,Quarterly and Annually</a:t>
+            </a:r>
+          </a:p>
+          <a:p>
+            <a:pPr>
+              <a:buFont typeface="Arial" pitchFamily="34" charset="0"/>
+              <a:buChar char="•"/>
+            </a:pPr>
+            <a:endParaRPr lang="en-US" sz="2000" dirty="0" smtClean="0">
+              <a:latin typeface="Times New Roman" pitchFamily="18" charset="0"/>
+              <a:cs typeface="Times New Roman" pitchFamily="18" charset="0"/>
+            </a:endParaRPr>
+          </a:p>
+          <a:p>
+            <a:pPr>
+              <a:buFont typeface="Arial" pitchFamily="34" charset="0"/>
+              <a:buChar char="•"/>
+            </a:pPr>
+            <a:r>
+              <a:rPr lang="en-US" sz="2000" dirty="0" smtClean="0">
+                <a:latin typeface="Times New Roman" pitchFamily="18" charset="0"/>
+                <a:cs typeface="Times New Roman" pitchFamily="18" charset="0"/>
+              </a:rPr>
+              <a:t>Checking Status of Target met, not met or Exceeded.  </a:t>
+            </a:r>
+          </a:p>
+          <a:p>
+            <a:pPr algn="just"/>
+            <a:endParaRPr lang="en-US" sz="2000" dirty="0" smtClean="0">
+              <a:latin typeface="Times New Roman" pitchFamily="18" charset="0"/>
+              <a:cs typeface="Times New Roman" pitchFamily="18" charset="0"/>
+            </a:endParaRPr>
+          </a:p>
+          <a:p>
+            <a:pPr algn="just"/>
+            <a:endParaRPr lang="en-US" sz="2800" dirty="0" smtClean="0">
+              <a:latin typeface="Times New Roman" pitchFamily="18" charset="0"/>
+              <a:cs typeface="Times New Roman" pitchFamily="18" charset="0"/>
+            </a:endParaRPr>
+          </a:p>
+          <a:p>
+            <a:pPr algn="just"/>
+            <a:endParaRPr lang="en-US" dirty="0">
+              <a:latin typeface="Times New Roman" pitchFamily="18" charset="0"/>
+              <a:cs typeface="Times New Roman" pitchFamily="18" charset="0"/>
+            </a:endParaRPr>
+          </a:p>
+        </p:txBody>
+      </p:sp>
+      <p:sp>
+        <p:nvSpPr>
+          <p:cNvPr id="6" name="TextBox 5"/>
+          <p:cNvSpPr txBox="1"/>
+          <p:nvPr/>
+        </p:nvSpPr>
+        <p:spPr>
+          <a:xfrm>
+            <a:off x="1164609" y="1573473"/>
+            <a:ext cx="3638550" cy="830997"/>
+          </a:xfrm>
+          <a:prstGeom prst="rect">
+            <a:avLst/>
+          </a:prstGeom>
+          <a:noFill/>
+        </p:spPr>
+        <p:txBody>
+          <a:bodyPr wrap="square" rtlCol="0">
+            <a:spAutoFit/>
+          </a:bodyPr>
+          <a:lstStyle/>
+          <a:p>
+            <a:pPr>
+              <a:buFont typeface="Arial" pitchFamily="34" charset="0"/>
+              <a:buChar char="•"/>
+            </a:pPr>
+            <a:r>
+              <a:rPr lang="en-US" sz="2800" b="1" dirty="0" smtClean="0">
+                <a:latin typeface="Times New Roman" pitchFamily="18" charset="0"/>
+                <a:cs typeface="Times New Roman" pitchFamily="18" charset="0"/>
+              </a:rPr>
+              <a:t>Sales Person Details</a:t>
+            </a:r>
+          </a:p>
+          <a:p>
+            <a:pPr>
+              <a:buFont typeface="Arial" pitchFamily="34" charset="0"/>
+              <a:buChar char="•"/>
+            </a:pPr>
+            <a:endParaRPr lang="en-US" sz="2000" dirty="0">
+              <a:latin typeface="Times New Roman" pitchFamily="18" charset="0"/>
+              <a:cs typeface="Times New Roman" pitchFamily="18" charset="0"/>
+            </a:endParaRPr>
+          </a:p>
+        </p:txBody>
+      </p:sp>
+    </p:spTree>
+    <p:extLst>
+      <p:ext uri="{BB962C8B-B14F-4D97-AF65-F5344CB8AC3E}">
+        <p14:creationId xmlns:p14="http://schemas.microsoft.com/office/powerpoint/2010/main" val="3882193602"/>
+      </p:ext>
+    </p:extLst>
+  </p:cSld>
+  <p:clrMapOvr>
+    <a:masterClrMapping/>
+  </p:clrMapOvr>
+</p:sld>
+</file>
+
 <file path=ppt/theme/theme1.xml><?xml version="1.0" encoding="utf-8"?>
 <a:theme xmlns:a="http://schemas.openxmlformats.org/drawingml/2006/main" name="Office Theme">
   <a:themeElements>

</xml_diff>